<commit_message>
EcoSys2.png add for corona datas
</commit_message>
<xml_diff>
--- a/CoronaDataPiping/Picture/CDP_pictures.pptx
+++ b/CoronaDataPiping/Picture/CDP_pictures.pptx
@@ -5,7 +5,8 @@
     <p:sldMasterId id="2147483648" r:id="rId1"/>
   </p:sldMasterIdLst>
   <p:sldIdLst>
-    <p:sldId id="256" r:id="rId2"/>
+    <p:sldId id="257" r:id="rId2"/>
+    <p:sldId id="256" r:id="rId3"/>
   </p:sldIdLst>
   <p:sldSz cx="12192000" cy="6858000"/>
   <p:notesSz cx="6858000" cy="9144000"/>
@@ -107,12 +108,12 @@
   <p:extLst>
     <p:ext uri="{EFAFB233-063F-42B5-8137-9DF3F51BA10A}">
       <p15:sldGuideLst xmlns:p15="http://schemas.microsoft.com/office/powerpoint/2012/main">
-        <p15:guide id="1" orient="horz" pos="2160" userDrawn="1">
+        <p15:guide id="1" orient="horz" pos="2183" userDrawn="1">
           <p15:clr>
             <a:srgbClr val="A4A3A4"/>
           </p15:clr>
         </p15:guide>
-        <p15:guide id="2" pos="3840" userDrawn="1">
+        <p15:guide id="2" pos="3817" userDrawn="1">
           <p15:clr>
             <a:srgbClr val="A4A3A4"/>
           </p15:clr>
@@ -254,7 +255,7 @@
           <a:p>
             <a:fld id="{811437BF-31E3-437B-9015-D2145B286CC4}" type="datetimeFigureOut">
               <a:rPr lang="ko-KR" altLang="en-US" smtClean="0"/>
-              <a:t>2020-11-30</a:t>
+              <a:t>2020-12-07</a:t>
             </a:fld>
             <a:endParaRPr lang="ko-KR" altLang="en-US"/>
           </a:p>
@@ -424,7 +425,7 @@
           <a:p>
             <a:fld id="{811437BF-31E3-437B-9015-D2145B286CC4}" type="datetimeFigureOut">
               <a:rPr lang="ko-KR" altLang="en-US" smtClean="0"/>
-              <a:t>2020-11-30</a:t>
+              <a:t>2020-12-07</a:t>
             </a:fld>
             <a:endParaRPr lang="ko-KR" altLang="en-US"/>
           </a:p>
@@ -604,7 +605,7 @@
           <a:p>
             <a:fld id="{811437BF-31E3-437B-9015-D2145B286CC4}" type="datetimeFigureOut">
               <a:rPr lang="ko-KR" altLang="en-US" smtClean="0"/>
-              <a:t>2020-11-30</a:t>
+              <a:t>2020-12-07</a:t>
             </a:fld>
             <a:endParaRPr lang="ko-KR" altLang="en-US"/>
           </a:p>
@@ -774,7 +775,7 @@
           <a:p>
             <a:fld id="{811437BF-31E3-437B-9015-D2145B286CC4}" type="datetimeFigureOut">
               <a:rPr lang="ko-KR" altLang="en-US" smtClean="0"/>
-              <a:t>2020-11-30</a:t>
+              <a:t>2020-12-07</a:t>
             </a:fld>
             <a:endParaRPr lang="ko-KR" altLang="en-US"/>
           </a:p>
@@ -1020,7 +1021,7 @@
           <a:p>
             <a:fld id="{811437BF-31E3-437B-9015-D2145B286CC4}" type="datetimeFigureOut">
               <a:rPr lang="ko-KR" altLang="en-US" smtClean="0"/>
-              <a:t>2020-11-30</a:t>
+              <a:t>2020-12-07</a:t>
             </a:fld>
             <a:endParaRPr lang="ko-KR" altLang="en-US"/>
           </a:p>
@@ -1252,7 +1253,7 @@
           <a:p>
             <a:fld id="{811437BF-31E3-437B-9015-D2145B286CC4}" type="datetimeFigureOut">
               <a:rPr lang="ko-KR" altLang="en-US" smtClean="0"/>
-              <a:t>2020-11-30</a:t>
+              <a:t>2020-12-07</a:t>
             </a:fld>
             <a:endParaRPr lang="ko-KR" altLang="en-US"/>
           </a:p>
@@ -1619,7 +1620,7 @@
           <a:p>
             <a:fld id="{811437BF-31E3-437B-9015-D2145B286CC4}" type="datetimeFigureOut">
               <a:rPr lang="ko-KR" altLang="en-US" smtClean="0"/>
-              <a:t>2020-11-30</a:t>
+              <a:t>2020-12-07</a:t>
             </a:fld>
             <a:endParaRPr lang="ko-KR" altLang="en-US"/>
           </a:p>
@@ -1737,7 +1738,7 @@
           <a:p>
             <a:fld id="{811437BF-31E3-437B-9015-D2145B286CC4}" type="datetimeFigureOut">
               <a:rPr lang="ko-KR" altLang="en-US" smtClean="0"/>
-              <a:t>2020-11-30</a:t>
+              <a:t>2020-12-07</a:t>
             </a:fld>
             <a:endParaRPr lang="ko-KR" altLang="en-US"/>
           </a:p>
@@ -1832,7 +1833,7 @@
           <a:p>
             <a:fld id="{811437BF-31E3-437B-9015-D2145B286CC4}" type="datetimeFigureOut">
               <a:rPr lang="ko-KR" altLang="en-US" smtClean="0"/>
-              <a:t>2020-11-30</a:t>
+              <a:t>2020-12-07</a:t>
             </a:fld>
             <a:endParaRPr lang="ko-KR" altLang="en-US"/>
           </a:p>
@@ -2109,7 +2110,7 @@
           <a:p>
             <a:fld id="{811437BF-31E3-437B-9015-D2145B286CC4}" type="datetimeFigureOut">
               <a:rPr lang="ko-KR" altLang="en-US" smtClean="0"/>
-              <a:t>2020-11-30</a:t>
+              <a:t>2020-12-07</a:t>
             </a:fld>
             <a:endParaRPr lang="ko-KR" altLang="en-US"/>
           </a:p>
@@ -2362,7 +2363,7 @@
           <a:p>
             <a:fld id="{811437BF-31E3-437B-9015-D2145B286CC4}" type="datetimeFigureOut">
               <a:rPr lang="ko-KR" altLang="en-US" smtClean="0"/>
-              <a:t>2020-11-30</a:t>
+              <a:t>2020-12-07</a:t>
             </a:fld>
             <a:endParaRPr lang="ko-KR" altLang="en-US"/>
           </a:p>
@@ -2575,7 +2576,7 @@
           <a:p>
             <a:fld id="{811437BF-31E3-437B-9015-D2145B286CC4}" type="datetimeFigureOut">
               <a:rPr lang="ko-KR" altLang="en-US" smtClean="0"/>
-              <a:t>2020-11-30</a:t>
+              <a:t>2020-12-07</a:t>
             </a:fld>
             <a:endParaRPr lang="ko-KR" altLang="en-US"/>
           </a:p>
@@ -3226,6 +3227,9 @@
                         <a14:foregroundMark x1="32438" y1="60178" x2="32438" y2="60178"/>
                         <a14:foregroundMark x1="32750" y1="58287" x2="35063" y2="59844"/>
                         <a14:foregroundMark x1="32625" y1="50501" x2="32625" y2="50501"/>
+                        <a14:foregroundMark x1="25000" y1="36400" x2="38514" y2="54000"/>
+                        <a14:foregroundMark x1="34910" y1="37600" x2="35586" y2="44000"/>
+                        <a14:foregroundMark x1="39189" y1="36000" x2="37162" y2="40000"/>
                       </a14:backgroundRemoval>
                     </a14:imgEffect>
                   </a14:imgLayer>
@@ -3727,6 +3731,1100 @@
               <a:gd name="adj1" fmla="val -21163"/>
               <a:gd name="adj2" fmla="val 87610"/>
             </a:avLst>
+          </a:prstGeom>
+          <a:ln w="12700">
+            <a:solidFill>
+              <a:schemeClr val="tx1"/>
+            </a:solidFill>
+            <a:tailEnd type="triangle"/>
+          </a:ln>
+        </p:spPr>
+        <p:style>
+          <a:lnRef idx="1">
+            <a:schemeClr val="accent1"/>
+          </a:lnRef>
+          <a:fillRef idx="0">
+            <a:schemeClr val="accent1"/>
+          </a:fillRef>
+          <a:effectRef idx="0">
+            <a:schemeClr val="accent1"/>
+          </a:effectRef>
+          <a:fontRef idx="minor">
+            <a:schemeClr val="tx1"/>
+          </a:fontRef>
+        </p:style>
+      </p:cxnSp>
+    </p:spTree>
+    <p:extLst>
+      <p:ext uri="{BB962C8B-B14F-4D97-AF65-F5344CB8AC3E}">
+        <p14:creationId xmlns:p14="http://schemas.microsoft.com/office/powerpoint/2010/main" val="851163212"/>
+      </p:ext>
+    </p:extLst>
+  </p:cSld>
+  <p:clrMapOvr>
+    <a:masterClrMapping/>
+  </p:clrMapOvr>
+</p:sld>
+</file>
+
+<file path=ppt/slides/slide2.xml><?xml version="1.0" encoding="utf-8"?>
+<p:sld xmlns:a="http://schemas.openxmlformats.org/drawingml/2006/main" xmlns:r="http://schemas.openxmlformats.org/officeDocument/2006/relationships" xmlns:p="http://schemas.openxmlformats.org/presentationml/2006/main">
+  <p:cSld>
+    <p:spTree>
+      <p:nvGrpSpPr>
+        <p:cNvPr id="1" name=""/>
+        <p:cNvGrpSpPr/>
+        <p:nvPr/>
+      </p:nvGrpSpPr>
+      <p:grpSpPr>
+        <a:xfrm>
+          <a:off x="0" y="0"/>
+          <a:ext cx="0" cy="0"/>
+          <a:chOff x="0" y="0"/>
+          <a:chExt cx="0" cy="0"/>
+        </a:xfrm>
+      </p:grpSpPr>
+      <p:sp>
+        <p:nvSpPr>
+          <p:cNvPr id="22" name="직사각형 21"/>
+          <p:cNvSpPr/>
+          <p:nvPr/>
+        </p:nvSpPr>
+        <p:spPr>
+          <a:xfrm>
+            <a:off x="4508429" y="4106758"/>
+            <a:ext cx="2806772" cy="2136360"/>
+          </a:xfrm>
+          <a:prstGeom prst="rect">
+            <a:avLst/>
+          </a:prstGeom>
+          <a:solidFill>
+            <a:schemeClr val="accent6">
+              <a:lumMod val="20000"/>
+              <a:lumOff val="80000"/>
+            </a:schemeClr>
+          </a:solidFill>
+          <a:ln w="28575">
+            <a:solidFill>
+              <a:schemeClr val="tx1"/>
+            </a:solidFill>
+          </a:ln>
+        </p:spPr>
+        <p:style>
+          <a:lnRef idx="2">
+            <a:schemeClr val="accent1">
+              <a:shade val="50000"/>
+            </a:schemeClr>
+          </a:lnRef>
+          <a:fillRef idx="1">
+            <a:schemeClr val="accent1"/>
+          </a:fillRef>
+          <a:effectRef idx="0">
+            <a:schemeClr val="accent1"/>
+          </a:effectRef>
+          <a:fontRef idx="minor">
+            <a:schemeClr val="lt1"/>
+          </a:fontRef>
+        </p:style>
+        <p:txBody>
+          <a:bodyPr vert="horz" rtlCol="0" anchor="ctr"/>
+          <a:lstStyle/>
+          <a:p>
+            <a:pPr algn="ctr"/>
+            <a:endParaRPr lang="en-US" altLang="ko-KR" b="1" dirty="0" smtClean="0">
+              <a:solidFill>
+                <a:schemeClr val="tx1"/>
+              </a:solidFill>
+            </a:endParaRPr>
+          </a:p>
+        </p:txBody>
+      </p:sp>
+      <p:sp>
+        <p:nvSpPr>
+          <p:cNvPr id="25" name="오른쪽 화살표 24"/>
+          <p:cNvSpPr/>
+          <p:nvPr/>
+        </p:nvSpPr>
+        <p:spPr>
+          <a:xfrm rot="5400000">
+            <a:off x="5485813" y="3505033"/>
+            <a:ext cx="662718" cy="484632"/>
+          </a:xfrm>
+          <a:prstGeom prst="rightArrow">
+            <a:avLst/>
+          </a:prstGeom>
+          <a:solidFill>
+            <a:schemeClr val="tx1"/>
+          </a:solidFill>
+          <a:ln>
+            <a:solidFill>
+              <a:schemeClr val="tx1"/>
+            </a:solidFill>
+          </a:ln>
+        </p:spPr>
+        <p:style>
+          <a:lnRef idx="2">
+            <a:schemeClr val="accent1">
+              <a:shade val="50000"/>
+            </a:schemeClr>
+          </a:lnRef>
+          <a:fillRef idx="1">
+            <a:schemeClr val="accent1"/>
+          </a:fillRef>
+          <a:effectRef idx="0">
+            <a:schemeClr val="accent1"/>
+          </a:effectRef>
+          <a:fontRef idx="minor">
+            <a:schemeClr val="lt1"/>
+          </a:fontRef>
+        </p:style>
+        <p:txBody>
+          <a:bodyPr rtlCol="0" anchor="ctr"/>
+          <a:lstStyle/>
+          <a:p>
+            <a:pPr algn="ctr"/>
+            <a:endParaRPr lang="ko-KR" altLang="en-US"/>
+          </a:p>
+        </p:txBody>
+      </p:sp>
+      <p:sp>
+        <p:nvSpPr>
+          <p:cNvPr id="13" name="직사각형 12"/>
+          <p:cNvSpPr/>
+          <p:nvPr/>
+        </p:nvSpPr>
+        <p:spPr>
+          <a:xfrm>
+            <a:off x="803901" y="919808"/>
+            <a:ext cx="6511300" cy="2509192"/>
+          </a:xfrm>
+          <a:prstGeom prst="rect">
+            <a:avLst/>
+          </a:prstGeom>
+          <a:solidFill>
+            <a:schemeClr val="accent6">
+              <a:lumMod val="20000"/>
+              <a:lumOff val="80000"/>
+            </a:schemeClr>
+          </a:solidFill>
+          <a:ln w="28575">
+            <a:solidFill>
+              <a:schemeClr val="tx1"/>
+            </a:solidFill>
+          </a:ln>
+        </p:spPr>
+        <p:style>
+          <a:lnRef idx="2">
+            <a:schemeClr val="accent1">
+              <a:shade val="50000"/>
+            </a:schemeClr>
+          </a:lnRef>
+          <a:fillRef idx="1">
+            <a:schemeClr val="accent1"/>
+          </a:fillRef>
+          <a:effectRef idx="0">
+            <a:schemeClr val="accent1"/>
+          </a:effectRef>
+          <a:fontRef idx="minor">
+            <a:schemeClr val="lt1"/>
+          </a:fontRef>
+        </p:style>
+        <p:txBody>
+          <a:bodyPr rtlCol="0" anchor="ctr"/>
+          <a:lstStyle/>
+          <a:p>
+            <a:pPr algn="ctr"/>
+            <a:endParaRPr lang="ko-KR" altLang="en-US"/>
+          </a:p>
+        </p:txBody>
+      </p:sp>
+      <p:pic>
+        <p:nvPicPr>
+          <p:cNvPr id="1026" name="Picture 2" descr="CoronaBoard Logo"/>
+          <p:cNvPicPr>
+            <a:picLocks noChangeAspect="1" noChangeArrowheads="1"/>
+          </p:cNvPicPr>
+          <p:nvPr/>
+        </p:nvPicPr>
+        <p:blipFill>
+          <a:blip r:embed="rId2">
+            <a:duotone>
+              <a:prstClr val="black"/>
+              <a:schemeClr val="accent5">
+                <a:tint val="45000"/>
+                <a:satMod val="400000"/>
+              </a:schemeClr>
+            </a:duotone>
+            <a:extLst>
+              <a:ext uri="{28A0092B-C50C-407E-A947-70E740481C1C}">
+                <a14:useLocalDpi xmlns:a14="http://schemas.microsoft.com/office/drawing/2010/main" val="0"/>
+              </a:ext>
+            </a:extLst>
+          </a:blip>
+          <a:srcRect/>
+          <a:stretch>
+            <a:fillRect/>
+          </a:stretch>
+        </p:blipFill>
+        <p:spPr bwMode="auto">
+          <a:xfrm>
+            <a:off x="1625708" y="173572"/>
+            <a:ext cx="2443247" cy="488649"/>
+          </a:xfrm>
+          <a:prstGeom prst="rect">
+            <a:avLst/>
+          </a:prstGeom>
+          <a:noFill/>
+          <a:extLst>
+            <a:ext uri="{909E8E84-426E-40DD-AFC4-6F175D3DCCD1}">
+              <a14:hiddenFill xmlns:a14="http://schemas.microsoft.com/office/drawing/2010/main">
+                <a:solidFill>
+                  <a:srgbClr val="FFFFFF"/>
+                </a:solidFill>
+              </a14:hiddenFill>
+            </a:ext>
+          </a:extLst>
+        </p:spPr>
+      </p:pic>
+      <p:pic>
+        <p:nvPicPr>
+          <p:cNvPr id="1030" name="Picture 6" descr="아파치 카프카(Kafka) : 설치 및 실행 - 2 of 3"/>
+          <p:cNvPicPr>
+            <a:picLocks noChangeAspect="1" noChangeArrowheads="1"/>
+          </p:cNvPicPr>
+          <p:nvPr/>
+        </p:nvPicPr>
+        <p:blipFill>
+          <a:blip r:embed="rId3" cstate="print">
+            <a:extLst>
+              <a:ext uri="{28A0092B-C50C-407E-A947-70E740481C1C}">
+                <a14:useLocalDpi xmlns:a14="http://schemas.microsoft.com/office/drawing/2010/main" val="0"/>
+              </a:ext>
+            </a:extLst>
+          </a:blip>
+          <a:srcRect/>
+          <a:stretch>
+            <a:fillRect/>
+          </a:stretch>
+        </p:blipFill>
+        <p:spPr bwMode="auto">
+          <a:xfrm>
+            <a:off x="1750370" y="2290814"/>
+            <a:ext cx="2193925" cy="654802"/>
+          </a:xfrm>
+          <a:prstGeom prst="rect">
+            <a:avLst/>
+          </a:prstGeom>
+          <a:noFill/>
+          <a:extLst>
+            <a:ext uri="{909E8E84-426E-40DD-AFC4-6F175D3DCCD1}">
+              <a14:hiddenFill xmlns:a14="http://schemas.microsoft.com/office/drawing/2010/main">
+                <a:solidFill>
+                  <a:srgbClr val="FFFFFF"/>
+                </a:solidFill>
+              </a14:hiddenFill>
+            </a:ext>
+          </a:extLst>
+        </p:spPr>
+      </p:pic>
+      <p:pic>
+        <p:nvPicPr>
+          <p:cNvPr id="8" name="그림 7"/>
+          <p:cNvPicPr>
+            <a:picLocks noChangeAspect="1"/>
+          </p:cNvPicPr>
+          <p:nvPr/>
+        </p:nvPicPr>
+        <p:blipFill>
+          <a:blip r:embed="rId4" cstate="print">
+            <a:extLst>
+              <a:ext uri="{28A0092B-C50C-407E-A947-70E740481C1C}">
+                <a14:useLocalDpi xmlns:a14="http://schemas.microsoft.com/office/drawing/2010/main" val="0"/>
+              </a:ext>
+            </a:extLst>
+          </a:blip>
+          <a:stretch>
+            <a:fillRect/>
+          </a:stretch>
+        </p:blipFill>
+        <p:spPr>
+          <a:xfrm>
+            <a:off x="4906556" y="1409872"/>
+            <a:ext cx="1689100" cy="465959"/>
+          </a:xfrm>
+          <a:prstGeom prst="rect">
+            <a:avLst/>
+          </a:prstGeom>
+        </p:spPr>
+      </p:pic>
+      <p:pic>
+        <p:nvPicPr>
+          <p:cNvPr id="9" name="그림 8"/>
+          <p:cNvPicPr>
+            <a:picLocks noChangeAspect="1"/>
+          </p:cNvPicPr>
+          <p:nvPr/>
+        </p:nvPicPr>
+        <p:blipFill>
+          <a:blip r:embed="rId5" cstate="print">
+            <a:extLst>
+              <a:ext uri="{28A0092B-C50C-407E-A947-70E740481C1C}">
+                <a14:useLocalDpi xmlns:a14="http://schemas.microsoft.com/office/drawing/2010/main" val="0"/>
+              </a:ext>
+            </a:extLst>
+          </a:blip>
+          <a:stretch>
+            <a:fillRect/>
+          </a:stretch>
+        </p:blipFill>
+        <p:spPr>
+          <a:xfrm>
+            <a:off x="4636706" y="2434339"/>
+            <a:ext cx="2228800" cy="461628"/>
+          </a:xfrm>
+          <a:prstGeom prst="rect">
+            <a:avLst/>
+          </a:prstGeom>
+        </p:spPr>
+      </p:pic>
+      <p:pic>
+        <p:nvPicPr>
+          <p:cNvPr id="10" name="그림 9"/>
+          <p:cNvPicPr>
+            <a:picLocks noChangeAspect="1"/>
+          </p:cNvPicPr>
+          <p:nvPr/>
+        </p:nvPicPr>
+        <p:blipFill>
+          <a:blip r:embed="rId6" cstate="print">
+            <a:extLst>
+              <a:ext uri="{28A0092B-C50C-407E-A947-70E740481C1C}">
+                <a14:useLocalDpi xmlns:a14="http://schemas.microsoft.com/office/drawing/2010/main" val="0"/>
+              </a:ext>
+            </a:extLst>
+          </a:blip>
+          <a:stretch>
+            <a:fillRect/>
+          </a:stretch>
+        </p:blipFill>
+        <p:spPr>
+          <a:xfrm>
+            <a:off x="5213440" y="4942146"/>
+            <a:ext cx="1396750" cy="465583"/>
+          </a:xfrm>
+          <a:prstGeom prst="rect">
+            <a:avLst/>
+          </a:prstGeom>
+        </p:spPr>
+      </p:pic>
+      <p:pic>
+        <p:nvPicPr>
+          <p:cNvPr id="1028" name="Picture 4" descr="How to “automate downloading files” using Python, Selenium, and Headless  Chrome | by Peter Moung | Medium"/>
+          <p:cNvPicPr>
+            <a:picLocks noChangeAspect="1" noChangeArrowheads="1"/>
+          </p:cNvPicPr>
+          <p:nvPr/>
+        </p:nvPicPr>
+        <p:blipFill rotWithShape="1">
+          <a:blip r:embed="rId7" cstate="print">
+            <a:extLst>
+              <a:ext uri="{BEBA8EAE-BF5A-486C-A8C5-ECC9F3942E4B}">
+                <a14:imgProps xmlns:a14="http://schemas.microsoft.com/office/drawing/2010/main">
+                  <a14:imgLayer r:embed="rId8">
+                    <a14:imgEffect>
+                      <a14:backgroundRemoval t="10000" b="90000" l="10000" r="90000">
+                        <a14:foregroundMark x1="27000" y1="52058" x2="22063" y2="57063"/>
+                        <a14:foregroundMark x1="24500" y1="58065" x2="28063" y2="60178"/>
+                        <a14:foregroundMark x1="32438" y1="60178" x2="32438" y2="60178"/>
+                        <a14:foregroundMark x1="32750" y1="58287" x2="35063" y2="59844"/>
+                        <a14:foregroundMark x1="32625" y1="50501" x2="32625" y2="50501"/>
+                        <a14:foregroundMark x1="24775" y1="37600" x2="29054" y2="47600"/>
+                        <a14:foregroundMark x1="31306" y1="36000" x2="35811" y2="45600"/>
+                        <a14:foregroundMark x1="38514" y1="32800" x2="36486" y2="38000"/>
+                      </a14:backgroundRemoval>
+                    </a14:imgEffect>
+                  </a14:imgLayer>
+                </a14:imgProps>
+              </a:ext>
+              <a:ext uri="{28A0092B-C50C-407E-A947-70E740481C1C}">
+                <a14:useLocalDpi xmlns:a14="http://schemas.microsoft.com/office/drawing/2010/main" val="0"/>
+              </a:ext>
+            </a:extLst>
+          </a:blip>
+          <a:srcRect l="18564" t="26164" r="55467" b="29179"/>
+          <a:stretch/>
+        </p:blipFill>
+        <p:spPr bwMode="auto">
+          <a:xfrm>
+            <a:off x="2607301" y="1375376"/>
+            <a:ext cx="480065" cy="463846"/>
+          </a:xfrm>
+          <a:prstGeom prst="rect">
+            <a:avLst/>
+          </a:prstGeom>
+          <a:noFill/>
+          <a:extLst>
+            <a:ext uri="{909E8E84-426E-40DD-AFC4-6F175D3DCCD1}">
+              <a14:hiddenFill xmlns:a14="http://schemas.microsoft.com/office/drawing/2010/main">
+                <a:solidFill>
+                  <a:srgbClr val="FFFFFF"/>
+                </a:solidFill>
+              </a14:hiddenFill>
+            </a:ext>
+          </a:extLst>
+        </p:spPr>
+      </p:pic>
+      <p:sp>
+        <p:nvSpPr>
+          <p:cNvPr id="23" name="직사각형 22"/>
+          <p:cNvSpPr/>
+          <p:nvPr/>
+        </p:nvSpPr>
+        <p:spPr>
+          <a:xfrm>
+            <a:off x="4457378" y="1161108"/>
+            <a:ext cx="2580635" cy="2082800"/>
+          </a:xfrm>
+          <a:prstGeom prst="rect">
+            <a:avLst/>
+          </a:prstGeom>
+          <a:noFill/>
+          <a:ln>
+            <a:solidFill>
+              <a:schemeClr val="tx1"/>
+            </a:solidFill>
+            <a:prstDash val="dash"/>
+          </a:ln>
+        </p:spPr>
+        <p:style>
+          <a:lnRef idx="2">
+            <a:schemeClr val="accent1">
+              <a:shade val="50000"/>
+            </a:schemeClr>
+          </a:lnRef>
+          <a:fillRef idx="1">
+            <a:schemeClr val="accent1"/>
+          </a:fillRef>
+          <a:effectRef idx="0">
+            <a:schemeClr val="accent1"/>
+          </a:effectRef>
+          <a:fontRef idx="minor">
+            <a:schemeClr val="lt1"/>
+          </a:fontRef>
+        </p:style>
+        <p:txBody>
+          <a:bodyPr rtlCol="0" anchor="ctr"/>
+          <a:lstStyle/>
+          <a:p>
+            <a:pPr algn="ctr"/>
+            <a:endParaRPr lang="ko-KR" altLang="en-US"/>
+          </a:p>
+        </p:txBody>
+      </p:sp>
+      <p:sp>
+        <p:nvSpPr>
+          <p:cNvPr id="17" name="직사각형 16"/>
+          <p:cNvSpPr/>
+          <p:nvPr/>
+        </p:nvSpPr>
+        <p:spPr>
+          <a:xfrm>
+            <a:off x="308780" y="750608"/>
+            <a:ext cx="1821055" cy="394996"/>
+          </a:xfrm>
+          <a:prstGeom prst="rect">
+            <a:avLst/>
+          </a:prstGeom>
+          <a:solidFill>
+            <a:schemeClr val="bg1">
+              <a:lumMod val="95000"/>
+            </a:schemeClr>
+          </a:solidFill>
+          <a:ln>
+            <a:solidFill>
+              <a:schemeClr val="tx1"/>
+            </a:solidFill>
+          </a:ln>
+        </p:spPr>
+        <p:style>
+          <a:lnRef idx="2">
+            <a:schemeClr val="accent1">
+              <a:shade val="50000"/>
+            </a:schemeClr>
+          </a:lnRef>
+          <a:fillRef idx="1">
+            <a:schemeClr val="accent1"/>
+          </a:fillRef>
+          <a:effectRef idx="0">
+            <a:schemeClr val="accent1"/>
+          </a:effectRef>
+          <a:fontRef idx="minor">
+            <a:schemeClr val="lt1"/>
+          </a:fontRef>
+        </p:style>
+        <p:txBody>
+          <a:bodyPr rtlCol="0" anchor="ctr"/>
+          <a:lstStyle/>
+          <a:p>
+            <a:pPr algn="ctr"/>
+            <a:r>
+              <a:rPr lang="en-US" altLang="ko-KR" b="1" dirty="0" smtClean="0">
+                <a:solidFill>
+                  <a:schemeClr val="tx1"/>
+                </a:solidFill>
+              </a:rPr>
+              <a:t>Ubuntu-18.04</a:t>
+            </a:r>
+            <a:endParaRPr lang="ko-KR" altLang="en-US" b="1" dirty="0">
+              <a:solidFill>
+                <a:schemeClr val="tx1"/>
+              </a:solidFill>
+            </a:endParaRPr>
+          </a:p>
+        </p:txBody>
+      </p:sp>
+      <p:cxnSp>
+        <p:nvCxnSpPr>
+          <p:cNvPr id="19" name="직선 화살표 연결선 18"/>
+          <p:cNvCxnSpPr>
+            <a:stCxn id="1026" idx="2"/>
+            <a:endCxn id="1028" idx="0"/>
+          </p:cNvCxnSpPr>
+          <p:nvPr/>
+        </p:nvCxnSpPr>
+        <p:spPr>
+          <a:xfrm>
+            <a:off x="2847332" y="662221"/>
+            <a:ext cx="2" cy="713155"/>
+          </a:xfrm>
+          <a:prstGeom prst="straightConnector1">
+            <a:avLst/>
+          </a:prstGeom>
+          <a:ln w="12700">
+            <a:solidFill>
+              <a:schemeClr val="tx1"/>
+            </a:solidFill>
+            <a:tailEnd type="triangle"/>
+          </a:ln>
+        </p:spPr>
+        <p:style>
+          <a:lnRef idx="1">
+            <a:schemeClr val="accent1"/>
+          </a:lnRef>
+          <a:fillRef idx="0">
+            <a:schemeClr val="accent1"/>
+          </a:fillRef>
+          <a:effectRef idx="0">
+            <a:schemeClr val="accent1"/>
+          </a:effectRef>
+          <a:fontRef idx="minor">
+            <a:schemeClr val="tx1"/>
+          </a:fontRef>
+        </p:style>
+      </p:cxnSp>
+      <p:cxnSp>
+        <p:nvCxnSpPr>
+          <p:cNvPr id="21" name="직선 화살표 연결선 20"/>
+          <p:cNvCxnSpPr>
+            <a:stCxn id="1028" idx="2"/>
+            <a:endCxn id="1030" idx="0"/>
+          </p:cNvCxnSpPr>
+          <p:nvPr/>
+        </p:nvCxnSpPr>
+        <p:spPr>
+          <a:xfrm flipH="1">
+            <a:off x="2847333" y="1839222"/>
+            <a:ext cx="1" cy="451592"/>
+          </a:xfrm>
+          <a:prstGeom prst="straightConnector1">
+            <a:avLst/>
+          </a:prstGeom>
+          <a:ln w="12700">
+            <a:solidFill>
+              <a:schemeClr val="tx1"/>
+            </a:solidFill>
+            <a:tailEnd type="triangle"/>
+          </a:ln>
+        </p:spPr>
+        <p:style>
+          <a:lnRef idx="1">
+            <a:schemeClr val="accent1"/>
+          </a:lnRef>
+          <a:fillRef idx="0">
+            <a:schemeClr val="accent1"/>
+          </a:fillRef>
+          <a:effectRef idx="0">
+            <a:schemeClr val="accent1"/>
+          </a:effectRef>
+          <a:fontRef idx="minor">
+            <a:schemeClr val="tx1"/>
+          </a:fontRef>
+        </p:style>
+      </p:cxnSp>
+      <p:sp>
+        <p:nvSpPr>
+          <p:cNvPr id="24" name="TextBox 23"/>
+          <p:cNvSpPr txBox="1"/>
+          <p:nvPr/>
+        </p:nvSpPr>
+        <p:spPr>
+          <a:xfrm>
+            <a:off x="4222715" y="3963228"/>
+            <a:ext cx="1367682" cy="369332"/>
+          </a:xfrm>
+          <a:prstGeom prst="rect">
+            <a:avLst/>
+          </a:prstGeom>
+          <a:solidFill>
+            <a:schemeClr val="accent6">
+              <a:lumMod val="20000"/>
+              <a:lumOff val="80000"/>
+            </a:schemeClr>
+          </a:solidFill>
+          <a:ln>
+            <a:solidFill>
+              <a:schemeClr val="tx1"/>
+            </a:solidFill>
+          </a:ln>
+        </p:spPr>
+        <p:txBody>
+          <a:bodyPr wrap="none" rtlCol="0">
+            <a:spAutoFit/>
+          </a:bodyPr>
+          <a:lstStyle/>
+          <a:p>
+            <a:r>
+              <a:rPr lang="en-US" altLang="ko-KR" b="1" dirty="0" smtClean="0"/>
+              <a:t>Visualizing</a:t>
+            </a:r>
+            <a:endParaRPr lang="ko-KR" altLang="en-US" b="1" dirty="0"/>
+          </a:p>
+        </p:txBody>
+      </p:sp>
+      <p:cxnSp>
+        <p:nvCxnSpPr>
+          <p:cNvPr id="27" name="꺾인 연결선 26"/>
+          <p:cNvCxnSpPr>
+            <a:stCxn id="1030" idx="3"/>
+            <a:endCxn id="8" idx="0"/>
+          </p:cNvCxnSpPr>
+          <p:nvPr/>
+        </p:nvCxnSpPr>
+        <p:spPr>
+          <a:xfrm flipV="1">
+            <a:off x="3944295" y="1409872"/>
+            <a:ext cx="1806811" cy="1208343"/>
+          </a:xfrm>
+          <a:prstGeom prst="bentConnector4">
+            <a:avLst>
+              <a:gd name="adj1" fmla="val 15309"/>
+              <a:gd name="adj2" fmla="val 128875"/>
+            </a:avLst>
+          </a:prstGeom>
+          <a:ln w="12700">
+            <a:solidFill>
+              <a:schemeClr val="tx1"/>
+            </a:solidFill>
+            <a:tailEnd type="triangle"/>
+          </a:ln>
+        </p:spPr>
+        <p:style>
+          <a:lnRef idx="1">
+            <a:schemeClr val="accent1"/>
+          </a:lnRef>
+          <a:fillRef idx="0">
+            <a:schemeClr val="accent1"/>
+          </a:fillRef>
+          <a:effectRef idx="0">
+            <a:schemeClr val="accent1"/>
+          </a:effectRef>
+          <a:fontRef idx="minor">
+            <a:schemeClr val="tx1"/>
+          </a:fontRef>
+        </p:style>
+      </p:cxnSp>
+      <p:cxnSp>
+        <p:nvCxnSpPr>
+          <p:cNvPr id="33" name="직선 화살표 연결선 32"/>
+          <p:cNvCxnSpPr>
+            <a:stCxn id="8" idx="2"/>
+            <a:endCxn id="9" idx="0"/>
+          </p:cNvCxnSpPr>
+          <p:nvPr/>
+        </p:nvCxnSpPr>
+        <p:spPr>
+          <a:xfrm>
+            <a:off x="5751106" y="1875831"/>
+            <a:ext cx="0" cy="558508"/>
+          </a:xfrm>
+          <a:prstGeom prst="straightConnector1">
+            <a:avLst/>
+          </a:prstGeom>
+          <a:ln>
+            <a:solidFill>
+              <a:schemeClr val="tx1"/>
+            </a:solidFill>
+            <a:tailEnd type="triangle"/>
+          </a:ln>
+        </p:spPr>
+        <p:style>
+          <a:lnRef idx="1">
+            <a:schemeClr val="accent1"/>
+          </a:lnRef>
+          <a:fillRef idx="0">
+            <a:schemeClr val="accent1"/>
+          </a:fillRef>
+          <a:effectRef idx="0">
+            <a:schemeClr val="accent1"/>
+          </a:effectRef>
+          <a:fontRef idx="minor">
+            <a:schemeClr val="tx1"/>
+          </a:fontRef>
+        </p:style>
+      </p:cxnSp>
+      <p:sp>
+        <p:nvSpPr>
+          <p:cNvPr id="20" name="직사각형 19"/>
+          <p:cNvSpPr/>
+          <p:nvPr/>
+        </p:nvSpPr>
+        <p:spPr>
+          <a:xfrm>
+            <a:off x="803901" y="3729466"/>
+            <a:ext cx="3359025" cy="2509192"/>
+          </a:xfrm>
+          <a:prstGeom prst="rect">
+            <a:avLst/>
+          </a:prstGeom>
+          <a:solidFill>
+            <a:schemeClr val="accent5">
+              <a:lumMod val="20000"/>
+              <a:lumOff val="80000"/>
+            </a:schemeClr>
+          </a:solidFill>
+          <a:ln w="28575">
+            <a:solidFill>
+              <a:schemeClr val="tx1"/>
+            </a:solidFill>
+          </a:ln>
+        </p:spPr>
+        <p:style>
+          <a:lnRef idx="2">
+            <a:schemeClr val="accent1">
+              <a:shade val="50000"/>
+            </a:schemeClr>
+          </a:lnRef>
+          <a:fillRef idx="1">
+            <a:schemeClr val="accent1"/>
+          </a:fillRef>
+          <a:effectRef idx="0">
+            <a:schemeClr val="accent1"/>
+          </a:effectRef>
+          <a:fontRef idx="minor">
+            <a:schemeClr val="lt1"/>
+          </a:fontRef>
+        </p:style>
+        <p:txBody>
+          <a:bodyPr rtlCol="0" anchor="ctr"/>
+          <a:lstStyle/>
+          <a:p>
+            <a:pPr algn="ctr"/>
+            <a:endParaRPr lang="ko-KR" altLang="en-US"/>
+          </a:p>
+        </p:txBody>
+      </p:sp>
+      <p:sp>
+        <p:nvSpPr>
+          <p:cNvPr id="26" name="직사각형 25"/>
+          <p:cNvSpPr/>
+          <p:nvPr/>
+        </p:nvSpPr>
+        <p:spPr>
+          <a:xfrm>
+            <a:off x="308780" y="6041160"/>
+            <a:ext cx="1821055" cy="394996"/>
+          </a:xfrm>
+          <a:prstGeom prst="rect">
+            <a:avLst/>
+          </a:prstGeom>
+          <a:solidFill>
+            <a:schemeClr val="bg1">
+              <a:lumMod val="95000"/>
+            </a:schemeClr>
+          </a:solidFill>
+          <a:ln>
+            <a:solidFill>
+              <a:schemeClr val="tx1"/>
+            </a:solidFill>
+          </a:ln>
+        </p:spPr>
+        <p:style>
+          <a:lnRef idx="2">
+            <a:schemeClr val="accent1">
+              <a:shade val="50000"/>
+            </a:schemeClr>
+          </a:lnRef>
+          <a:fillRef idx="1">
+            <a:schemeClr val="accent1"/>
+          </a:fillRef>
+          <a:effectRef idx="0">
+            <a:schemeClr val="accent1"/>
+          </a:effectRef>
+          <a:fontRef idx="minor">
+            <a:schemeClr val="lt1"/>
+          </a:fontRef>
+        </p:style>
+        <p:txBody>
+          <a:bodyPr rtlCol="0" anchor="ctr"/>
+          <a:lstStyle/>
+          <a:p>
+            <a:pPr algn="ctr"/>
+            <a:r>
+              <a:rPr lang="en-US" altLang="ko-KR" b="1" dirty="0" smtClean="0">
+                <a:solidFill>
+                  <a:schemeClr val="tx1"/>
+                </a:solidFill>
+              </a:rPr>
+              <a:t>Windows10</a:t>
+            </a:r>
+            <a:endParaRPr lang="ko-KR" altLang="en-US" b="1" dirty="0">
+              <a:solidFill>
+                <a:schemeClr val="tx1"/>
+              </a:solidFill>
+            </a:endParaRPr>
+          </a:p>
+        </p:txBody>
+      </p:sp>
+      <p:pic>
+        <p:nvPicPr>
+          <p:cNvPr id="2" name="Picture 2" descr="Coronavirus Update (Live): 63,217,877 Cases and 1,467,733 Deaths from  COVID-19 Virus Pandemic - Worldometer"/>
+          <p:cNvPicPr>
+            <a:picLocks noChangeAspect="1" noChangeArrowheads="1"/>
+          </p:cNvPicPr>
+          <p:nvPr/>
+        </p:nvPicPr>
+        <p:blipFill>
+          <a:blip r:embed="rId9">
+            <a:extLst>
+              <a:ext uri="{28A0092B-C50C-407E-A947-70E740481C1C}">
+                <a14:useLocalDpi xmlns:a14="http://schemas.microsoft.com/office/drawing/2010/main" val="0"/>
+              </a:ext>
+            </a:extLst>
+          </a:blip>
+          <a:srcRect/>
+          <a:stretch>
+            <a:fillRect/>
+          </a:stretch>
+        </p:blipFill>
+        <p:spPr bwMode="auto">
+          <a:xfrm>
+            <a:off x="2921067" y="4472448"/>
+            <a:ext cx="1023228" cy="1023228"/>
+          </a:xfrm>
+          <a:prstGeom prst="rect">
+            <a:avLst/>
+          </a:prstGeom>
+          <a:noFill/>
+          <a:extLst>
+            <a:ext uri="{909E8E84-426E-40DD-AFC4-6F175D3DCCD1}">
+              <a14:hiddenFill xmlns:a14="http://schemas.microsoft.com/office/drawing/2010/main">
+                <a:solidFill>
+                  <a:srgbClr val="FFFFFF"/>
+                </a:solidFill>
+              </a14:hiddenFill>
+            </a:ext>
+          </a:extLst>
+        </p:spPr>
+      </p:pic>
+      <p:pic>
+        <p:nvPicPr>
+          <p:cNvPr id="28" name="Picture 4" descr="How to “automate downloading files” using Python, Selenium, and Headless  Chrome | by Peter Moung | Medium"/>
+          <p:cNvPicPr>
+            <a:picLocks noChangeAspect="1" noChangeArrowheads="1"/>
+          </p:cNvPicPr>
+          <p:nvPr/>
+        </p:nvPicPr>
+        <p:blipFill rotWithShape="1">
+          <a:blip r:embed="rId7" cstate="print">
+            <a:extLst>
+              <a:ext uri="{BEBA8EAE-BF5A-486C-A8C5-ECC9F3942E4B}">
+                <a14:imgProps xmlns:a14="http://schemas.microsoft.com/office/drawing/2010/main">
+                  <a14:imgLayer r:embed="rId8">
+                    <a14:imgEffect>
+                      <a14:backgroundRemoval t="10000" b="90000" l="10000" r="90000">
+                        <a14:foregroundMark x1="27000" y1="52058" x2="22063" y2="57063"/>
+                        <a14:foregroundMark x1="24500" y1="58065" x2="28063" y2="60178"/>
+                        <a14:foregroundMark x1="32438" y1="60178" x2="32438" y2="60178"/>
+                        <a14:foregroundMark x1="32750" y1="58287" x2="35063" y2="59844"/>
+                        <a14:foregroundMark x1="32625" y1="50501" x2="32625" y2="50501"/>
+                        <a14:foregroundMark x1="24775" y1="37600" x2="29054" y2="47600"/>
+                        <a14:foregroundMark x1="31306" y1="36000" x2="35811" y2="45600"/>
+                        <a14:foregroundMark x1="38514" y1="32800" x2="36486" y2="38000"/>
+                      </a14:backgroundRemoval>
+                    </a14:imgEffect>
+                  </a14:imgLayer>
+                </a14:imgProps>
+              </a:ext>
+              <a:ext uri="{28A0092B-C50C-407E-A947-70E740481C1C}">
+                <a14:useLocalDpi xmlns:a14="http://schemas.microsoft.com/office/drawing/2010/main" val="0"/>
+              </a:ext>
+            </a:extLst>
+          </a:blip>
+          <a:srcRect l="18564" t="26164" r="55467" b="29179"/>
+          <a:stretch/>
+        </p:blipFill>
+        <p:spPr bwMode="auto">
+          <a:xfrm>
+            <a:off x="1255568" y="4752139"/>
+            <a:ext cx="480065" cy="463846"/>
+          </a:xfrm>
+          <a:prstGeom prst="rect">
+            <a:avLst/>
+          </a:prstGeom>
+          <a:noFill/>
+          <a:extLst>
+            <a:ext uri="{909E8E84-426E-40DD-AFC4-6F175D3DCCD1}">
+              <a14:hiddenFill xmlns:a14="http://schemas.microsoft.com/office/drawing/2010/main">
+                <a:solidFill>
+                  <a:srgbClr val="FFFFFF"/>
+                </a:solidFill>
+              </a14:hiddenFill>
+            </a:ext>
+          </a:extLst>
+        </p:spPr>
+      </p:pic>
+      <p:cxnSp>
+        <p:nvCxnSpPr>
+          <p:cNvPr id="4" name="직선 화살표 연결선 3"/>
+          <p:cNvCxnSpPr>
+            <a:stCxn id="2" idx="1"/>
+            <a:endCxn id="28" idx="3"/>
+          </p:cNvCxnSpPr>
+          <p:nvPr/>
+        </p:nvCxnSpPr>
+        <p:spPr>
+          <a:xfrm flipH="1">
+            <a:off x="1735633" y="4984062"/>
+            <a:ext cx="1185434" cy="0"/>
+          </a:xfrm>
+          <a:prstGeom prst="straightConnector1">
+            <a:avLst/>
+          </a:prstGeom>
+          <a:ln w="12700">
+            <a:solidFill>
+              <a:schemeClr val="tx1"/>
+            </a:solidFill>
+            <a:tailEnd type="triangle"/>
+          </a:ln>
+        </p:spPr>
+        <p:style>
+          <a:lnRef idx="1">
+            <a:schemeClr val="accent1"/>
+          </a:lnRef>
+          <a:fillRef idx="0">
+            <a:schemeClr val="accent1"/>
+          </a:fillRef>
+          <a:effectRef idx="0">
+            <a:schemeClr val="accent1"/>
+          </a:effectRef>
+          <a:fontRef idx="minor">
+            <a:schemeClr val="tx1"/>
+          </a:fontRef>
+        </p:style>
+      </p:cxnSp>
+      <p:cxnSp>
+        <p:nvCxnSpPr>
+          <p:cNvPr id="48" name="꺾인 연결선 47"/>
+          <p:cNvCxnSpPr>
+            <a:stCxn id="25" idx="3"/>
+            <a:endCxn id="10" idx="0"/>
+          </p:cNvCxnSpPr>
+          <p:nvPr/>
+        </p:nvCxnSpPr>
+        <p:spPr>
+          <a:xfrm rot="16200000" flipH="1">
+            <a:off x="5432774" y="4463105"/>
+            <a:ext cx="863438" cy="94643"/>
+          </a:xfrm>
+          <a:prstGeom prst="bentConnector3">
+            <a:avLst/>
+          </a:prstGeom>
+          <a:ln w="12700">
+            <a:solidFill>
+              <a:schemeClr val="tx1"/>
+            </a:solidFill>
+            <a:tailEnd type="triangle"/>
+          </a:ln>
+        </p:spPr>
+        <p:style>
+          <a:lnRef idx="1">
+            <a:schemeClr val="accent1"/>
+          </a:lnRef>
+          <a:fillRef idx="0">
+            <a:schemeClr val="accent1"/>
+          </a:fillRef>
+          <a:effectRef idx="0">
+            <a:schemeClr val="accent1"/>
+          </a:effectRef>
+          <a:fontRef idx="minor">
+            <a:schemeClr val="tx1"/>
+          </a:fontRef>
+        </p:style>
+      </p:cxnSp>
+      <p:cxnSp>
+        <p:nvCxnSpPr>
+          <p:cNvPr id="50" name="꺾인 연결선 49"/>
+          <p:cNvCxnSpPr>
+            <a:stCxn id="28" idx="0"/>
+            <a:endCxn id="1030" idx="2"/>
+          </p:cNvCxnSpPr>
+          <p:nvPr/>
+        </p:nvCxnSpPr>
+        <p:spPr>
+          <a:xfrm rot="5400000" flipH="1" flipV="1">
+            <a:off x="1268206" y="3173012"/>
+            <a:ext cx="1806523" cy="1351732"/>
+          </a:xfrm>
+          <a:prstGeom prst="bentConnector3">
+            <a:avLst/>
+          </a:prstGeom>
+          <a:ln w="12700">
+            <a:solidFill>
+              <a:schemeClr val="tx1"/>
+            </a:solidFill>
+            <a:tailEnd type="triangle"/>
+          </a:ln>
+        </p:spPr>
+        <p:style>
+          <a:lnRef idx="1">
+            <a:schemeClr val="accent1"/>
+          </a:lnRef>
+          <a:fillRef idx="0">
+            <a:schemeClr val="accent1"/>
+          </a:fillRef>
+          <a:effectRef idx="0">
+            <a:schemeClr val="accent1"/>
+          </a:effectRef>
+          <a:fontRef idx="minor">
+            <a:schemeClr val="tx1"/>
+          </a:fontRef>
+        </p:style>
+      </p:cxnSp>
+      <p:cxnSp>
+        <p:nvCxnSpPr>
+          <p:cNvPr id="54" name="꺾인 연결선 53"/>
+          <p:cNvCxnSpPr>
+            <a:stCxn id="9" idx="2"/>
+          </p:cNvCxnSpPr>
+          <p:nvPr/>
+        </p:nvCxnSpPr>
+        <p:spPr>
+          <a:xfrm rot="16200000" flipH="1">
+            <a:off x="5524127" y="3122945"/>
+            <a:ext cx="520023" cy="66065"/>
+          </a:xfrm>
+          <a:prstGeom prst="bentConnector3">
+            <a:avLst/>
           </a:prstGeom>
           <a:ln w="12700">
             <a:solidFill>

</xml_diff>